<commit_message>
Adiciona telas de Perfil e Editar perfil
</commit_message>
<xml_diff>
--- a/Documentos/Status Report/StatusReport.pptx
+++ b/Documentos/Status Report/StatusReport.pptx
@@ -7,16 +7,17 @@
     <p:sldMasterId id="2147483665" r:id="rId6"/>
   </p:sldMasterIdLst>
   <p:notesMasterIdLst>
-    <p:notesMasterId r:id="rId11"/>
+    <p:notesMasterId r:id="rId12"/>
   </p:notesMasterIdLst>
   <p:handoutMasterIdLst>
-    <p:handoutMasterId r:id="rId12"/>
+    <p:handoutMasterId r:id="rId13"/>
   </p:handoutMasterIdLst>
   <p:sldIdLst>
     <p:sldId id="472" r:id="rId7"/>
     <p:sldId id="482" r:id="rId8"/>
     <p:sldId id="483" r:id="rId9"/>
     <p:sldId id="484" r:id="rId10"/>
+    <p:sldId id="485" r:id="rId11"/>
   </p:sldIdLst>
   <p:sldSz cx="13442950" cy="7561263"/>
   <p:notesSz cx="7104063" cy="10234613"/>
@@ -127,6 +128,7 @@
             <p14:sldId id="482"/>
             <p14:sldId id="483"/>
             <p14:sldId id="484"/>
+            <p14:sldId id="485"/>
           </p14:sldIdLst>
         </p14:section>
       </p14:sectionLst>
@@ -686,7 +688,7 @@
             <a:fld id="{C3CD65D1-5C11-455D-9F9A-0E035F00A0DA}" type="datetimeFigureOut">
               <a:rPr lang="pt-BR" smtClean="0"/>
               <a:pPr/>
-              <a:t>03/03/2022</a:t>
+              <a:t>08/03/2022</a:t>
             </a:fld>
             <a:endParaRPr lang="pt-BR"/>
           </a:p>
@@ -753,7 +755,7 @@
             <a:fld id="{CA8E3B7C-E4AE-4E9E-8479-7C668141D483}" type="slidenum">
               <a:rPr lang="pt-BR" smtClean="0"/>
               <a:pPr/>
-              <a:t>‹#›</a:t>
+              <a:t>‹nº›</a:t>
             </a:fld>
             <a:endParaRPr lang="pt-BR"/>
           </a:p>
@@ -854,7 +856,7 @@
             <a:fld id="{A05DA3EF-18EA-43DE-B1BB-402A3C558822}" type="datetimeFigureOut">
               <a:rPr lang="pt-BR" smtClean="0"/>
               <a:pPr/>
-              <a:t>03/03/2022</a:t>
+              <a:t>08/03/2022</a:t>
             </a:fld>
             <a:endParaRPr lang="pt-BR"/>
           </a:p>
@@ -1015,7 +1017,7 @@
             <a:fld id="{75B3645A-D0AE-4F6E-A17E-E0036A9041AF}" type="slidenum">
               <a:rPr lang="pt-BR" smtClean="0"/>
               <a:pPr/>
-              <a:t>‹#›</a:t>
+              <a:t>‹nº›</a:t>
             </a:fld>
             <a:endParaRPr lang="pt-BR"/>
           </a:p>
@@ -4542,7 +4544,7 @@
               <a:pPr>
                 <a:defRPr/>
               </a:pPr>
-              <a:t>‹#›</a:t>
+              <a:t>‹nº›</a:t>
             </a:fld>
             <a:endParaRPr lang="pt-BR" sz="700" dirty="0"/>
           </a:p>
@@ -18851,7 +18853,7 @@
                 </a:solidFill>
               </a:rPr>
               <a:pPr/>
-              <a:t>‹#›</a:t>
+              <a:t>‹nº›</a:t>
             </a:fld>
             <a:endParaRPr lang="pt-BR" dirty="0">
               <a:solidFill>
@@ -19366,7 +19368,7 @@
               <a:pPr>
                 <a:defRPr/>
               </a:pPr>
-              <a:t>‹#›</a:t>
+              <a:t>‹nº›</a:t>
             </a:fld>
             <a:endParaRPr lang="pt-BR" sz="700" dirty="0"/>
           </a:p>
@@ -27300,6 +27302,2161 @@
     <p:extLst>
       <p:ext uri="{BB962C8B-B14F-4D97-AF65-F5344CB8AC3E}">
         <p14:creationId xmlns:p14="http://schemas.microsoft.com/office/powerpoint/2010/main" val="3664926626"/>
+      </p:ext>
+    </p:extLst>
+  </p:cSld>
+  <p:clrMapOvr>
+    <a:masterClrMapping/>
+  </p:clrMapOvr>
+</p:sld>
+</file>
+
+<file path=ppt/slides/slide5.xml><?xml version="1.0" encoding="utf-8"?>
+<p:sld xmlns:a="http://schemas.openxmlformats.org/drawingml/2006/main" xmlns:r="http://schemas.openxmlformats.org/officeDocument/2006/relationships" xmlns:p="http://schemas.openxmlformats.org/presentationml/2006/main">
+  <p:cSld>
+    <p:spTree>
+      <p:nvGrpSpPr>
+        <p:cNvPr id="1" name=""/>
+        <p:cNvGrpSpPr/>
+        <p:nvPr/>
+      </p:nvGrpSpPr>
+      <p:grpSpPr>
+        <a:xfrm>
+          <a:off x="0" y="0"/>
+          <a:ext cx="0" cy="0"/>
+          <a:chOff x="0" y="0"/>
+          <a:chExt cx="0" cy="0"/>
+        </a:xfrm>
+      </p:grpSpPr>
+      <p:sp>
+        <p:nvSpPr>
+          <p:cNvPr id="3" name="Espaço Reservado para Número de Slide 2">
+            <a:extLst>
+              <a:ext uri="{FF2B5EF4-FFF2-40B4-BE49-F238E27FC236}">
+                <a16:creationId xmlns:a16="http://schemas.microsoft.com/office/drawing/2014/main" id="{25E66A94-914F-497A-A098-71B8A170A7DE}"/>
+              </a:ext>
+            </a:extLst>
+          </p:cNvPr>
+          <p:cNvSpPr>
+            <a:spLocks noGrp="1"/>
+          </p:cNvSpPr>
+          <p:nvPr>
+            <p:ph type="sldNum" sz="quarter" idx="4"/>
+          </p:nvPr>
+        </p:nvSpPr>
+        <p:spPr/>
+        <p:txBody>
+          <a:bodyPr/>
+          <a:lstStyle/>
+          <a:p>
+            <a:fld id="{74850952-3374-434C-8FC6-DE28F8CD25B0}" type="slidenum">
+              <a:rPr lang="pt-BR" smtClean="0">
+                <a:solidFill>
+                  <a:prstClr val="black">
+                    <a:tint val="75000"/>
+                  </a:prstClr>
+                </a:solidFill>
+              </a:rPr>
+              <a:pPr/>
+              <a:t>5</a:t>
+            </a:fld>
+            <a:endParaRPr lang="pt-BR" dirty="0">
+              <a:solidFill>
+                <a:prstClr val="black">
+                  <a:tint val="75000"/>
+                </a:prstClr>
+              </a:solidFill>
+            </a:endParaRPr>
+          </a:p>
+        </p:txBody>
+      </p:sp>
+      <p:sp>
+        <p:nvSpPr>
+          <p:cNvPr id="20" name="Rectangle 42">
+            <a:extLst>
+              <a:ext uri="{FF2B5EF4-FFF2-40B4-BE49-F238E27FC236}">
+                <a16:creationId xmlns:a16="http://schemas.microsoft.com/office/drawing/2014/main" id="{D56D5B31-1798-4A73-939D-5495975295D4}"/>
+              </a:ext>
+            </a:extLst>
+          </p:cNvPr>
+          <p:cNvSpPr/>
+          <p:nvPr/>
+        </p:nvSpPr>
+        <p:spPr>
+          <a:xfrm>
+            <a:off x="6804884" y="1106495"/>
+            <a:ext cx="6204408" cy="2962168"/>
+          </a:xfrm>
+          <a:prstGeom prst="rect">
+            <a:avLst/>
+          </a:prstGeom>
+          <a:noFill/>
+          <a:ln w="12700">
+            <a:solidFill>
+              <a:schemeClr val="bg1">
+                <a:lumMod val="50000"/>
+              </a:schemeClr>
+            </a:solidFill>
+          </a:ln>
+        </p:spPr>
+        <p:style>
+          <a:lnRef idx="2">
+            <a:schemeClr val="accent4"/>
+          </a:lnRef>
+          <a:fillRef idx="1">
+            <a:schemeClr val="lt1"/>
+          </a:fillRef>
+          <a:effectRef idx="0">
+            <a:schemeClr val="accent4"/>
+          </a:effectRef>
+          <a:fontRef idx="minor">
+            <a:schemeClr val="dk1"/>
+          </a:fontRef>
+        </p:style>
+        <p:txBody>
+          <a:bodyPr tIns="105844" rtlCol="0" anchor="t"/>
+          <a:lstStyle/>
+          <a:p>
+            <a:pPr defTabSz="672130">
+              <a:spcAft>
+                <a:spcPts val="882"/>
+              </a:spcAft>
+            </a:pPr>
+            <a:endParaRPr lang="pt-BR" sz="1470" dirty="0">
+              <a:solidFill>
+                <a:schemeClr val="tx1"/>
+              </a:solidFill>
+              <a:latin typeface="Exo 2 Medium" panose="00000600000000000000" pitchFamily="50" charset="0"/>
+              <a:cs typeface="Simplon BP Regular"/>
+            </a:endParaRPr>
+          </a:p>
+        </p:txBody>
+      </p:sp>
+      <p:sp>
+        <p:nvSpPr>
+          <p:cNvPr id="21" name="Title 2">
+            <a:extLst>
+              <a:ext uri="{FF2B5EF4-FFF2-40B4-BE49-F238E27FC236}">
+                <a16:creationId xmlns:a16="http://schemas.microsoft.com/office/drawing/2014/main" id="{C488E075-24DD-4CAC-A846-48FBDF28D797}"/>
+              </a:ext>
+            </a:extLst>
+          </p:cNvPr>
+          <p:cNvSpPr>
+            <a:spLocks noGrp="1"/>
+          </p:cNvSpPr>
+          <p:nvPr>
+            <p:ph type="title"/>
+          </p:nvPr>
+        </p:nvSpPr>
+        <p:spPr>
+          <a:xfrm>
+            <a:off x="469692" y="185232"/>
+            <a:ext cx="12098020" cy="800352"/>
+          </a:xfrm>
+        </p:spPr>
+        <p:txBody>
+          <a:bodyPr vert="horz" wrap="square" lIns="105844" tIns="0" rIns="105844" bIns="0" numCol="1" anchor="t" anchorCtr="0" compatLnSpc="1">
+            <a:prstTxWarp prst="textNoShape">
+              <a:avLst/>
+            </a:prstTxWarp>
+            <a:noAutofit/>
+          </a:bodyPr>
+          <a:lstStyle/>
+          <a:p>
+            <a:pPr algn="l">
+              <a:spcAft>
+                <a:spcPts val="882"/>
+              </a:spcAft>
+            </a:pPr>
+            <a:r>
+              <a:rPr lang="en-US" sz="2646" dirty="0">
+                <a:solidFill>
+                  <a:srgbClr val="08276B"/>
+                </a:solidFill>
+                <a:latin typeface="Exo 2 Medium" panose="00000600000000000000" pitchFamily="50" charset="0"/>
+                <a:cs typeface="Simplon Oi Headline"/>
+              </a:rPr>
+              <a:t>SEMANA 4 – 08/03/2022</a:t>
+            </a:r>
+          </a:p>
+        </p:txBody>
+      </p:sp>
+      <p:sp>
+        <p:nvSpPr>
+          <p:cNvPr id="22" name="TextBox 118">
+            <a:extLst>
+              <a:ext uri="{FF2B5EF4-FFF2-40B4-BE49-F238E27FC236}">
+                <a16:creationId xmlns:a16="http://schemas.microsoft.com/office/drawing/2014/main" id="{BD7B98C2-C566-441C-A8E5-BA505B2CA31F}"/>
+              </a:ext>
+            </a:extLst>
+          </p:cNvPr>
+          <p:cNvSpPr txBox="1"/>
+          <p:nvPr/>
+        </p:nvSpPr>
+        <p:spPr>
+          <a:xfrm>
+            <a:off x="11822773" y="576471"/>
+            <a:ext cx="899678" cy="179824"/>
+          </a:xfrm>
+          <a:prstGeom prst="rect">
+            <a:avLst/>
+          </a:prstGeom>
+          <a:noFill/>
+          <a:ln w="12700">
+            <a:noFill/>
+          </a:ln>
+        </p:spPr>
+        <p:style>
+          <a:lnRef idx="2">
+            <a:schemeClr val="accent4"/>
+          </a:lnRef>
+          <a:fillRef idx="1">
+            <a:schemeClr val="lt1"/>
+          </a:fillRef>
+          <a:effectRef idx="0">
+            <a:schemeClr val="accent4"/>
+          </a:effectRef>
+          <a:fontRef idx="minor">
+            <a:schemeClr val="dk1"/>
+          </a:fontRef>
+        </p:style>
+        <p:txBody>
+          <a:bodyPr wrap="none" lIns="52922" tIns="52922" rIns="52922" bIns="0" rtlCol="0" anchor="b"/>
+          <a:lstStyle>
+            <a:defPPr>
+              <a:defRPr lang="en-US"/>
+            </a:defPPr>
+            <a:lvl1pPr algn="ctr">
+              <a:defRPr sz="1000" b="1">
+                <a:latin typeface="Simplon BP Regular"/>
+                <a:cs typeface="Simplon BP Regular"/>
+              </a:defRPr>
+            </a:lvl1pPr>
+            <a:lvl2pPr>
+              <a:defRPr>
+                <a:solidFill>
+                  <a:schemeClr val="dk1"/>
+                </a:solidFill>
+              </a:defRPr>
+            </a:lvl2pPr>
+            <a:lvl3pPr>
+              <a:defRPr>
+                <a:solidFill>
+                  <a:schemeClr val="dk1"/>
+                </a:solidFill>
+              </a:defRPr>
+            </a:lvl3pPr>
+            <a:lvl4pPr>
+              <a:defRPr>
+                <a:solidFill>
+                  <a:schemeClr val="dk1"/>
+                </a:solidFill>
+              </a:defRPr>
+            </a:lvl4pPr>
+            <a:lvl5pPr>
+              <a:defRPr>
+                <a:solidFill>
+                  <a:schemeClr val="dk1"/>
+                </a:solidFill>
+              </a:defRPr>
+            </a:lvl5pPr>
+            <a:lvl6pPr>
+              <a:defRPr>
+                <a:solidFill>
+                  <a:schemeClr val="dk1"/>
+                </a:solidFill>
+              </a:defRPr>
+            </a:lvl6pPr>
+            <a:lvl7pPr>
+              <a:defRPr>
+                <a:solidFill>
+                  <a:schemeClr val="dk1"/>
+                </a:solidFill>
+              </a:defRPr>
+            </a:lvl7pPr>
+            <a:lvl8pPr>
+              <a:defRPr>
+                <a:solidFill>
+                  <a:schemeClr val="dk1"/>
+                </a:solidFill>
+              </a:defRPr>
+            </a:lvl8pPr>
+            <a:lvl9pPr>
+              <a:defRPr>
+                <a:solidFill>
+                  <a:schemeClr val="dk1"/>
+                </a:solidFill>
+              </a:defRPr>
+            </a:lvl9pPr>
+          </a:lstStyle>
+          <a:p>
+            <a:pPr defTabSz="672130"/>
+            <a:r>
+              <a:rPr lang="pt-BR" sz="1176" b="0" dirty="0">
+                <a:solidFill>
+                  <a:prstClr val="black"/>
+                </a:solidFill>
+                <a:latin typeface="Exo 2 Medium" panose="00000600000000000000" pitchFamily="50" charset="0"/>
+              </a:rPr>
+              <a:t>Negócios</a:t>
+            </a:r>
+          </a:p>
+        </p:txBody>
+      </p:sp>
+      <p:sp>
+        <p:nvSpPr>
+          <p:cNvPr id="23" name="Oval 120">
+            <a:extLst>
+              <a:ext uri="{FF2B5EF4-FFF2-40B4-BE49-F238E27FC236}">
+                <a16:creationId xmlns:a16="http://schemas.microsoft.com/office/drawing/2014/main" id="{D512B11E-A0D6-43B9-9FAB-A12852EB997C}"/>
+              </a:ext>
+            </a:extLst>
+          </p:cNvPr>
+          <p:cNvSpPr>
+            <a:spLocks noChangeAspect="1"/>
+          </p:cNvSpPr>
+          <p:nvPr/>
+        </p:nvSpPr>
+        <p:spPr>
+          <a:xfrm>
+            <a:off x="11193898" y="324247"/>
+            <a:ext cx="211404" cy="211689"/>
+          </a:xfrm>
+          <a:prstGeom prst="ellipse">
+            <a:avLst/>
+          </a:prstGeom>
+          <a:solidFill>
+            <a:srgbClr val="1BCF13"/>
+          </a:solidFill>
+          <a:ln w="12700">
+            <a:solidFill>
+              <a:schemeClr val="accent3"/>
+            </a:solidFill>
+          </a:ln>
+        </p:spPr>
+        <p:style>
+          <a:lnRef idx="2">
+            <a:schemeClr val="accent1">
+              <a:shade val="50000"/>
+            </a:schemeClr>
+          </a:lnRef>
+          <a:fillRef idx="1">
+            <a:schemeClr val="accent1"/>
+          </a:fillRef>
+          <a:effectRef idx="0">
+            <a:schemeClr val="accent1"/>
+          </a:effectRef>
+          <a:fontRef idx="minor">
+            <a:schemeClr val="lt1"/>
+          </a:fontRef>
+        </p:style>
+        <p:txBody>
+          <a:bodyPr wrap="none" lIns="52922" tIns="52922" rIns="52922" rtlCol="0" anchor="ctr"/>
+          <a:lstStyle/>
+          <a:p>
+            <a:pPr algn="ctr" defTabSz="672130"/>
+            <a:endParaRPr lang="en-US" sz="1176" dirty="0">
+              <a:solidFill>
+                <a:srgbClr val="1BCF13"/>
+              </a:solidFill>
+              <a:latin typeface="Exo 2 Medium" panose="00000600000000000000" pitchFamily="50" charset="0"/>
+              <a:cs typeface="Simplon BP Regular"/>
+            </a:endParaRPr>
+          </a:p>
+        </p:txBody>
+      </p:sp>
+      <p:sp>
+        <p:nvSpPr>
+          <p:cNvPr id="24" name="TextBox 123">
+            <a:extLst>
+              <a:ext uri="{FF2B5EF4-FFF2-40B4-BE49-F238E27FC236}">
+                <a16:creationId xmlns:a16="http://schemas.microsoft.com/office/drawing/2014/main" id="{DF2A6510-AF00-4432-92E4-F9CD9E5F17D8}"/>
+              </a:ext>
+            </a:extLst>
+          </p:cNvPr>
+          <p:cNvSpPr txBox="1"/>
+          <p:nvPr/>
+        </p:nvSpPr>
+        <p:spPr>
+          <a:xfrm>
+            <a:off x="10852497" y="576471"/>
+            <a:ext cx="899678" cy="179824"/>
+          </a:xfrm>
+          <a:prstGeom prst="rect">
+            <a:avLst/>
+          </a:prstGeom>
+          <a:noFill/>
+          <a:ln w="12700">
+            <a:noFill/>
+          </a:ln>
+        </p:spPr>
+        <p:style>
+          <a:lnRef idx="2">
+            <a:schemeClr val="accent4"/>
+          </a:lnRef>
+          <a:fillRef idx="1">
+            <a:schemeClr val="lt1"/>
+          </a:fillRef>
+          <a:effectRef idx="0">
+            <a:schemeClr val="accent4"/>
+          </a:effectRef>
+          <a:fontRef idx="minor">
+            <a:schemeClr val="dk1"/>
+          </a:fontRef>
+        </p:style>
+        <p:txBody>
+          <a:bodyPr wrap="none" lIns="52922" tIns="52922" rIns="52922" bIns="0" rtlCol="0" anchor="b"/>
+          <a:lstStyle>
+            <a:defPPr>
+              <a:defRPr lang="en-US"/>
+            </a:defPPr>
+            <a:lvl1pPr algn="ctr">
+              <a:defRPr sz="1000" b="1">
+                <a:latin typeface="Simplon BP Regular"/>
+                <a:cs typeface="Simplon BP Regular"/>
+              </a:defRPr>
+            </a:lvl1pPr>
+            <a:lvl2pPr>
+              <a:defRPr>
+                <a:solidFill>
+                  <a:schemeClr val="dk1"/>
+                </a:solidFill>
+              </a:defRPr>
+            </a:lvl2pPr>
+            <a:lvl3pPr>
+              <a:defRPr>
+                <a:solidFill>
+                  <a:schemeClr val="dk1"/>
+                </a:solidFill>
+              </a:defRPr>
+            </a:lvl3pPr>
+            <a:lvl4pPr>
+              <a:defRPr>
+                <a:solidFill>
+                  <a:schemeClr val="dk1"/>
+                </a:solidFill>
+              </a:defRPr>
+            </a:lvl4pPr>
+            <a:lvl5pPr>
+              <a:defRPr>
+                <a:solidFill>
+                  <a:schemeClr val="dk1"/>
+                </a:solidFill>
+              </a:defRPr>
+            </a:lvl5pPr>
+            <a:lvl6pPr>
+              <a:defRPr>
+                <a:solidFill>
+                  <a:schemeClr val="dk1"/>
+                </a:solidFill>
+              </a:defRPr>
+            </a:lvl6pPr>
+            <a:lvl7pPr>
+              <a:defRPr>
+                <a:solidFill>
+                  <a:schemeClr val="dk1"/>
+                </a:solidFill>
+              </a:defRPr>
+            </a:lvl7pPr>
+            <a:lvl8pPr>
+              <a:defRPr>
+                <a:solidFill>
+                  <a:schemeClr val="dk1"/>
+                </a:solidFill>
+              </a:defRPr>
+            </a:lvl8pPr>
+            <a:lvl9pPr>
+              <a:defRPr>
+                <a:solidFill>
+                  <a:schemeClr val="dk1"/>
+                </a:solidFill>
+              </a:defRPr>
+            </a:lvl9pPr>
+          </a:lstStyle>
+          <a:p>
+            <a:pPr defTabSz="672130"/>
+            <a:r>
+              <a:rPr lang="pt-BR" sz="1176" b="0" dirty="0">
+                <a:solidFill>
+                  <a:prstClr val="black"/>
+                </a:solidFill>
+                <a:latin typeface="Exo 2 Medium" panose="00000600000000000000" pitchFamily="50" charset="0"/>
+              </a:rPr>
+              <a:t>Plataforma</a:t>
+            </a:r>
+          </a:p>
+        </p:txBody>
+      </p:sp>
+      <p:sp>
+        <p:nvSpPr>
+          <p:cNvPr id="25" name="TextBox 128">
+            <a:extLst>
+              <a:ext uri="{FF2B5EF4-FFF2-40B4-BE49-F238E27FC236}">
+                <a16:creationId xmlns:a16="http://schemas.microsoft.com/office/drawing/2014/main" id="{983CE74D-5B8F-4DD1-8C18-E4BE116FF1DC}"/>
+              </a:ext>
+            </a:extLst>
+          </p:cNvPr>
+          <p:cNvSpPr txBox="1"/>
+          <p:nvPr/>
+        </p:nvSpPr>
+        <p:spPr>
+          <a:xfrm>
+            <a:off x="9854245" y="576471"/>
+            <a:ext cx="899678" cy="179824"/>
+          </a:xfrm>
+          <a:prstGeom prst="rect">
+            <a:avLst/>
+          </a:prstGeom>
+          <a:noFill/>
+          <a:ln w="12700">
+            <a:noFill/>
+          </a:ln>
+        </p:spPr>
+        <p:style>
+          <a:lnRef idx="2">
+            <a:schemeClr val="accent4"/>
+          </a:lnRef>
+          <a:fillRef idx="1">
+            <a:schemeClr val="lt1"/>
+          </a:fillRef>
+          <a:effectRef idx="0">
+            <a:schemeClr val="accent4"/>
+          </a:effectRef>
+          <a:fontRef idx="minor">
+            <a:schemeClr val="dk1"/>
+          </a:fontRef>
+        </p:style>
+        <p:txBody>
+          <a:bodyPr wrap="none" lIns="52922" tIns="52922" rIns="52922" bIns="0" rtlCol="0" anchor="b"/>
+          <a:lstStyle>
+            <a:defPPr>
+              <a:defRPr lang="en-US"/>
+            </a:defPPr>
+            <a:lvl1pPr algn="ctr">
+              <a:defRPr sz="1000" b="1">
+                <a:latin typeface="Simplon BP Regular"/>
+                <a:cs typeface="Simplon BP Regular"/>
+              </a:defRPr>
+            </a:lvl1pPr>
+            <a:lvl2pPr>
+              <a:defRPr>
+                <a:solidFill>
+                  <a:schemeClr val="dk1"/>
+                </a:solidFill>
+              </a:defRPr>
+            </a:lvl2pPr>
+            <a:lvl3pPr>
+              <a:defRPr>
+                <a:solidFill>
+                  <a:schemeClr val="dk1"/>
+                </a:solidFill>
+              </a:defRPr>
+            </a:lvl3pPr>
+            <a:lvl4pPr>
+              <a:defRPr>
+                <a:solidFill>
+                  <a:schemeClr val="dk1"/>
+                </a:solidFill>
+              </a:defRPr>
+            </a:lvl4pPr>
+            <a:lvl5pPr>
+              <a:defRPr>
+                <a:solidFill>
+                  <a:schemeClr val="dk1"/>
+                </a:solidFill>
+              </a:defRPr>
+            </a:lvl5pPr>
+            <a:lvl6pPr>
+              <a:defRPr>
+                <a:solidFill>
+                  <a:schemeClr val="dk1"/>
+                </a:solidFill>
+              </a:defRPr>
+            </a:lvl6pPr>
+            <a:lvl7pPr>
+              <a:defRPr>
+                <a:solidFill>
+                  <a:schemeClr val="dk1"/>
+                </a:solidFill>
+              </a:defRPr>
+            </a:lvl7pPr>
+            <a:lvl8pPr>
+              <a:defRPr>
+                <a:solidFill>
+                  <a:schemeClr val="dk1"/>
+                </a:solidFill>
+              </a:defRPr>
+            </a:lvl8pPr>
+            <a:lvl9pPr>
+              <a:defRPr>
+                <a:solidFill>
+                  <a:schemeClr val="dk1"/>
+                </a:solidFill>
+              </a:defRPr>
+            </a:lvl9pPr>
+          </a:lstStyle>
+          <a:p>
+            <a:pPr defTabSz="672130"/>
+            <a:r>
+              <a:rPr lang="pt-BR" sz="1176" b="0" dirty="0">
+                <a:solidFill>
+                  <a:prstClr val="black"/>
+                </a:solidFill>
+                <a:latin typeface="Exo 2 Medium" panose="00000600000000000000" pitchFamily="50" charset="0"/>
+              </a:rPr>
+              <a:t>Back</a:t>
+            </a:r>
+          </a:p>
+        </p:txBody>
+      </p:sp>
+      <p:sp>
+        <p:nvSpPr>
+          <p:cNvPr id="26" name="TextBox 133">
+            <a:extLst>
+              <a:ext uri="{FF2B5EF4-FFF2-40B4-BE49-F238E27FC236}">
+                <a16:creationId xmlns:a16="http://schemas.microsoft.com/office/drawing/2014/main" id="{FE1215A2-D778-4D77-9417-6C32B4E10829}"/>
+              </a:ext>
+            </a:extLst>
+          </p:cNvPr>
+          <p:cNvSpPr txBox="1"/>
+          <p:nvPr/>
+        </p:nvSpPr>
+        <p:spPr>
+          <a:xfrm>
+            <a:off x="8888645" y="576471"/>
+            <a:ext cx="899678" cy="179824"/>
+          </a:xfrm>
+          <a:prstGeom prst="rect">
+            <a:avLst/>
+          </a:prstGeom>
+          <a:noFill/>
+          <a:ln w="12700">
+            <a:noFill/>
+          </a:ln>
+        </p:spPr>
+        <p:style>
+          <a:lnRef idx="2">
+            <a:schemeClr val="accent4"/>
+          </a:lnRef>
+          <a:fillRef idx="1">
+            <a:schemeClr val="lt1"/>
+          </a:fillRef>
+          <a:effectRef idx="0">
+            <a:schemeClr val="accent4"/>
+          </a:effectRef>
+          <a:fontRef idx="minor">
+            <a:schemeClr val="dk1"/>
+          </a:fontRef>
+        </p:style>
+        <p:txBody>
+          <a:bodyPr wrap="none" lIns="52922" tIns="52922" rIns="52922" bIns="0" rtlCol="0" anchor="b"/>
+          <a:lstStyle>
+            <a:defPPr>
+              <a:defRPr lang="en-US"/>
+            </a:defPPr>
+            <a:lvl1pPr algn="ctr">
+              <a:defRPr sz="1000" b="1">
+                <a:latin typeface="Simplon BP Regular"/>
+                <a:cs typeface="Simplon BP Regular"/>
+              </a:defRPr>
+            </a:lvl1pPr>
+            <a:lvl2pPr>
+              <a:defRPr>
+                <a:solidFill>
+                  <a:schemeClr val="dk1"/>
+                </a:solidFill>
+              </a:defRPr>
+            </a:lvl2pPr>
+            <a:lvl3pPr>
+              <a:defRPr>
+                <a:solidFill>
+                  <a:schemeClr val="dk1"/>
+                </a:solidFill>
+              </a:defRPr>
+            </a:lvl3pPr>
+            <a:lvl4pPr>
+              <a:defRPr>
+                <a:solidFill>
+                  <a:schemeClr val="dk1"/>
+                </a:solidFill>
+              </a:defRPr>
+            </a:lvl4pPr>
+            <a:lvl5pPr>
+              <a:defRPr>
+                <a:solidFill>
+                  <a:schemeClr val="dk1"/>
+                </a:solidFill>
+              </a:defRPr>
+            </a:lvl5pPr>
+            <a:lvl6pPr>
+              <a:defRPr>
+                <a:solidFill>
+                  <a:schemeClr val="dk1"/>
+                </a:solidFill>
+              </a:defRPr>
+            </a:lvl6pPr>
+            <a:lvl7pPr>
+              <a:defRPr>
+                <a:solidFill>
+                  <a:schemeClr val="dk1"/>
+                </a:solidFill>
+              </a:defRPr>
+            </a:lvl7pPr>
+            <a:lvl8pPr>
+              <a:defRPr>
+                <a:solidFill>
+                  <a:schemeClr val="dk1"/>
+                </a:solidFill>
+              </a:defRPr>
+            </a:lvl8pPr>
+            <a:lvl9pPr>
+              <a:defRPr>
+                <a:solidFill>
+                  <a:schemeClr val="dk1"/>
+                </a:solidFill>
+              </a:defRPr>
+            </a:lvl9pPr>
+          </a:lstStyle>
+          <a:p>
+            <a:pPr defTabSz="672130"/>
+            <a:r>
+              <a:rPr lang="pt-BR" sz="1176" b="0" dirty="0">
+                <a:solidFill>
+                  <a:prstClr val="black"/>
+                </a:solidFill>
+                <a:latin typeface="Exo 2 Medium" panose="00000600000000000000" pitchFamily="50" charset="0"/>
+              </a:rPr>
+              <a:t>Front</a:t>
+            </a:r>
+          </a:p>
+        </p:txBody>
+      </p:sp>
+      <p:sp>
+        <p:nvSpPr>
+          <p:cNvPr id="27" name="Oval 134">
+            <a:extLst>
+              <a:ext uri="{FF2B5EF4-FFF2-40B4-BE49-F238E27FC236}">
+                <a16:creationId xmlns:a16="http://schemas.microsoft.com/office/drawing/2014/main" id="{E0659533-7794-44EF-87B8-DFFD796E8DCB}"/>
+              </a:ext>
+            </a:extLst>
+          </p:cNvPr>
+          <p:cNvSpPr>
+            <a:spLocks noChangeAspect="1"/>
+          </p:cNvSpPr>
+          <p:nvPr/>
+        </p:nvSpPr>
+        <p:spPr>
+          <a:xfrm>
+            <a:off x="8443555" y="297930"/>
+            <a:ext cx="211404" cy="211689"/>
+          </a:xfrm>
+          <a:prstGeom prst="ellipse">
+            <a:avLst/>
+          </a:prstGeom>
+          <a:solidFill>
+            <a:srgbClr val="FFC000"/>
+          </a:solidFill>
+          <a:ln w="12700">
+            <a:solidFill>
+              <a:schemeClr val="accent3"/>
+            </a:solidFill>
+          </a:ln>
+        </p:spPr>
+        <p:style>
+          <a:lnRef idx="2">
+            <a:schemeClr val="accent1">
+              <a:shade val="50000"/>
+            </a:schemeClr>
+          </a:lnRef>
+          <a:fillRef idx="1">
+            <a:schemeClr val="accent1"/>
+          </a:fillRef>
+          <a:effectRef idx="0">
+            <a:schemeClr val="accent1"/>
+          </a:effectRef>
+          <a:fontRef idx="minor">
+            <a:schemeClr val="lt1"/>
+          </a:fontRef>
+        </p:style>
+        <p:txBody>
+          <a:bodyPr wrap="none" lIns="52922" tIns="52922" rIns="52922" rtlCol="0" anchor="ctr"/>
+          <a:lstStyle/>
+          <a:p>
+            <a:pPr algn="ctr" defTabSz="672130"/>
+            <a:endParaRPr lang="en-US" sz="1176" dirty="0">
+              <a:solidFill>
+                <a:srgbClr val="FFC000"/>
+              </a:solidFill>
+              <a:latin typeface="Exo 2 Medium" panose="00000600000000000000" pitchFamily="50" charset="0"/>
+              <a:cs typeface="Simplon BP Regular"/>
+            </a:endParaRPr>
+          </a:p>
+        </p:txBody>
+      </p:sp>
+      <p:sp>
+        <p:nvSpPr>
+          <p:cNvPr id="28" name="TextBox 138">
+            <a:extLst>
+              <a:ext uri="{FF2B5EF4-FFF2-40B4-BE49-F238E27FC236}">
+                <a16:creationId xmlns:a16="http://schemas.microsoft.com/office/drawing/2014/main" id="{CFC76C64-835E-4901-A393-78B96741EBC6}"/>
+              </a:ext>
+            </a:extLst>
+          </p:cNvPr>
+          <p:cNvSpPr txBox="1"/>
+          <p:nvPr/>
+        </p:nvSpPr>
+        <p:spPr>
+          <a:xfrm>
+            <a:off x="8126053" y="576471"/>
+            <a:ext cx="899678" cy="179824"/>
+          </a:xfrm>
+          <a:prstGeom prst="rect">
+            <a:avLst/>
+          </a:prstGeom>
+          <a:noFill/>
+          <a:ln w="12700">
+            <a:noFill/>
+          </a:ln>
+        </p:spPr>
+        <p:style>
+          <a:lnRef idx="2">
+            <a:schemeClr val="accent4"/>
+          </a:lnRef>
+          <a:fillRef idx="1">
+            <a:schemeClr val="lt1"/>
+          </a:fillRef>
+          <a:effectRef idx="0">
+            <a:schemeClr val="accent4"/>
+          </a:effectRef>
+          <a:fontRef idx="minor">
+            <a:schemeClr val="dk1"/>
+          </a:fontRef>
+        </p:style>
+        <p:txBody>
+          <a:bodyPr wrap="none" lIns="52922" tIns="52922" rIns="52922" bIns="0" rtlCol="0" anchor="b"/>
+          <a:lstStyle>
+            <a:defPPr>
+              <a:defRPr lang="en-US"/>
+            </a:defPPr>
+            <a:lvl1pPr algn="ctr">
+              <a:defRPr sz="1000" b="1">
+                <a:latin typeface="Simplon BP Regular"/>
+                <a:cs typeface="Simplon BP Regular"/>
+              </a:defRPr>
+            </a:lvl1pPr>
+            <a:lvl2pPr>
+              <a:defRPr>
+                <a:solidFill>
+                  <a:schemeClr val="dk1"/>
+                </a:solidFill>
+              </a:defRPr>
+            </a:lvl2pPr>
+            <a:lvl3pPr>
+              <a:defRPr>
+                <a:solidFill>
+                  <a:schemeClr val="dk1"/>
+                </a:solidFill>
+              </a:defRPr>
+            </a:lvl3pPr>
+            <a:lvl4pPr>
+              <a:defRPr>
+                <a:solidFill>
+                  <a:schemeClr val="dk1"/>
+                </a:solidFill>
+              </a:defRPr>
+            </a:lvl4pPr>
+            <a:lvl5pPr>
+              <a:defRPr>
+                <a:solidFill>
+                  <a:schemeClr val="dk1"/>
+                </a:solidFill>
+              </a:defRPr>
+            </a:lvl5pPr>
+            <a:lvl6pPr>
+              <a:defRPr>
+                <a:solidFill>
+                  <a:schemeClr val="dk1"/>
+                </a:solidFill>
+              </a:defRPr>
+            </a:lvl6pPr>
+            <a:lvl7pPr>
+              <a:defRPr>
+                <a:solidFill>
+                  <a:schemeClr val="dk1"/>
+                </a:solidFill>
+              </a:defRPr>
+            </a:lvl7pPr>
+            <a:lvl8pPr>
+              <a:defRPr>
+                <a:solidFill>
+                  <a:schemeClr val="dk1"/>
+                </a:solidFill>
+              </a:defRPr>
+            </a:lvl8pPr>
+            <a:lvl9pPr>
+              <a:defRPr>
+                <a:solidFill>
+                  <a:schemeClr val="dk1"/>
+                </a:solidFill>
+              </a:defRPr>
+            </a:lvl9pPr>
+          </a:lstStyle>
+          <a:p>
+            <a:pPr defTabSz="672130"/>
+            <a:r>
+              <a:rPr lang="en-US" sz="1176" b="0" dirty="0" err="1">
+                <a:solidFill>
+                  <a:prstClr val="black"/>
+                </a:solidFill>
+                <a:latin typeface="Exo 2 Medium" panose="00000600000000000000" pitchFamily="50" charset="0"/>
+              </a:rPr>
+              <a:t>Equipe</a:t>
+            </a:r>
+            <a:endParaRPr lang="en-US" sz="1176" b="0" dirty="0">
+              <a:solidFill>
+                <a:prstClr val="black"/>
+              </a:solidFill>
+              <a:latin typeface="Exo 2 Medium" panose="00000600000000000000" pitchFamily="50" charset="0"/>
+            </a:endParaRPr>
+          </a:p>
+        </p:txBody>
+      </p:sp>
+      <p:sp>
+        <p:nvSpPr>
+          <p:cNvPr id="29" name="Retângulo 28">
+            <a:extLst>
+              <a:ext uri="{FF2B5EF4-FFF2-40B4-BE49-F238E27FC236}">
+                <a16:creationId xmlns:a16="http://schemas.microsoft.com/office/drawing/2014/main" id="{1E43F633-0A68-4D0F-AC0D-375E22F80328}"/>
+              </a:ext>
+            </a:extLst>
+          </p:cNvPr>
+          <p:cNvSpPr/>
+          <p:nvPr/>
+        </p:nvSpPr>
+        <p:spPr>
+          <a:xfrm>
+            <a:off x="512766" y="868345"/>
+            <a:ext cx="6186608" cy="238150"/>
+          </a:xfrm>
+          <a:prstGeom prst="rect">
+            <a:avLst/>
+          </a:prstGeom>
+          <a:solidFill>
+            <a:srgbClr val="08276B"/>
+          </a:solidFill>
+        </p:spPr>
+        <p:txBody>
+          <a:bodyPr vert="horz" lIns="134422" tIns="67211" rIns="134422" bIns="67211" rtlCol="0" anchor="ctr"/>
+          <a:lstStyle/>
+          <a:p>
+            <a:pPr defTabSz="672130"/>
+            <a:r>
+              <a:rPr lang="en-US" sz="1544" dirty="0">
+                <a:solidFill>
+                  <a:schemeClr val="bg1"/>
+                </a:solidFill>
+                <a:latin typeface="Exo 2 Medium" panose="00000600000000000000" pitchFamily="50" charset="0"/>
+                <a:ea typeface="Simplon Oi Headline" charset="0"/>
+                <a:cs typeface="Simplon Oi Headline" charset="0"/>
+              </a:rPr>
+              <a:t>Progressos c/ responsáveis </a:t>
+            </a:r>
+          </a:p>
+        </p:txBody>
+      </p:sp>
+      <p:sp>
+        <p:nvSpPr>
+          <p:cNvPr id="30" name="Retângulo 29">
+            <a:extLst>
+              <a:ext uri="{FF2B5EF4-FFF2-40B4-BE49-F238E27FC236}">
+                <a16:creationId xmlns:a16="http://schemas.microsoft.com/office/drawing/2014/main" id="{D543C29D-67E1-4031-9D29-169B0DBC6EA2}"/>
+              </a:ext>
+            </a:extLst>
+          </p:cNvPr>
+          <p:cNvSpPr/>
+          <p:nvPr/>
+        </p:nvSpPr>
+        <p:spPr>
+          <a:xfrm>
+            <a:off x="6814576" y="868345"/>
+            <a:ext cx="6194715" cy="238150"/>
+          </a:xfrm>
+          <a:prstGeom prst="rect">
+            <a:avLst/>
+          </a:prstGeom>
+          <a:solidFill>
+            <a:srgbClr val="08276B"/>
+          </a:solidFill>
+        </p:spPr>
+        <p:txBody>
+          <a:bodyPr vert="horz" lIns="134422" tIns="67211" rIns="134422" bIns="67211" rtlCol="0" anchor="ctr"/>
+          <a:lstStyle/>
+          <a:p>
+            <a:pPr defTabSz="672130"/>
+            <a:r>
+              <a:rPr lang="pt-BR" sz="1544" dirty="0">
+                <a:solidFill>
+                  <a:schemeClr val="bg1"/>
+                </a:solidFill>
+                <a:latin typeface="Exo 2 Medium" panose="00000600000000000000" pitchFamily="50" charset="0"/>
+                <a:ea typeface="Simplon Oi Headline" charset="0"/>
+                <a:cs typeface="Simplon Oi Headline" charset="0"/>
+              </a:rPr>
+              <a:t>Pontos atenção/ Principais Riscos</a:t>
+            </a:r>
+          </a:p>
+        </p:txBody>
+      </p:sp>
+      <p:sp>
+        <p:nvSpPr>
+          <p:cNvPr id="31" name="Retângulo 30">
+            <a:extLst>
+              <a:ext uri="{FF2B5EF4-FFF2-40B4-BE49-F238E27FC236}">
+                <a16:creationId xmlns:a16="http://schemas.microsoft.com/office/drawing/2014/main" id="{DA8C0DE2-12B6-4997-B780-BE9D9F8E16D6}"/>
+              </a:ext>
+            </a:extLst>
+          </p:cNvPr>
+          <p:cNvSpPr/>
+          <p:nvPr/>
+        </p:nvSpPr>
+        <p:spPr>
+          <a:xfrm>
+            <a:off x="508267" y="4152347"/>
+            <a:ext cx="12505521" cy="238150"/>
+          </a:xfrm>
+          <a:prstGeom prst="rect">
+            <a:avLst/>
+          </a:prstGeom>
+          <a:solidFill>
+            <a:srgbClr val="08276B"/>
+          </a:solidFill>
+        </p:spPr>
+        <p:txBody>
+          <a:bodyPr vert="horz" lIns="134422" tIns="67211" rIns="134422" bIns="67211" rtlCol="0" anchor="ctr"/>
+          <a:lstStyle/>
+          <a:p>
+            <a:pPr defTabSz="672130"/>
+            <a:r>
+              <a:rPr lang="pt-BR" sz="1544" dirty="0">
+                <a:solidFill>
+                  <a:schemeClr val="bg1"/>
+                </a:solidFill>
+                <a:latin typeface="Exo 2 Medium" panose="00000600000000000000" pitchFamily="50" charset="0"/>
+                <a:ea typeface="Simplon Oi Headline" charset="0"/>
+                <a:cs typeface="Simplon Oi Headline" charset="0"/>
+              </a:rPr>
+              <a:t>Próximos Passos c/ responsáveis </a:t>
+            </a:r>
+          </a:p>
+        </p:txBody>
+      </p:sp>
+      <p:sp>
+        <p:nvSpPr>
+          <p:cNvPr id="32" name="Rectangle 37">
+            <a:extLst>
+              <a:ext uri="{FF2B5EF4-FFF2-40B4-BE49-F238E27FC236}">
+                <a16:creationId xmlns:a16="http://schemas.microsoft.com/office/drawing/2014/main" id="{224F3AF8-BD84-4D63-8F6E-083FA677F2DB}"/>
+              </a:ext>
+            </a:extLst>
+          </p:cNvPr>
+          <p:cNvSpPr/>
+          <p:nvPr/>
+        </p:nvSpPr>
+        <p:spPr>
+          <a:xfrm>
+            <a:off x="496766" y="1106495"/>
+            <a:ext cx="6186608" cy="2962168"/>
+          </a:xfrm>
+          <a:prstGeom prst="rect">
+            <a:avLst/>
+          </a:prstGeom>
+          <a:noFill/>
+          <a:ln w="12700">
+            <a:solidFill>
+              <a:schemeClr val="bg1">
+                <a:lumMod val="50000"/>
+              </a:schemeClr>
+            </a:solidFill>
+          </a:ln>
+        </p:spPr>
+        <p:style>
+          <a:lnRef idx="2">
+            <a:schemeClr val="accent4"/>
+          </a:lnRef>
+          <a:fillRef idx="1">
+            <a:schemeClr val="lt1"/>
+          </a:fillRef>
+          <a:effectRef idx="0">
+            <a:schemeClr val="accent4"/>
+          </a:effectRef>
+          <a:fontRef idx="minor">
+            <a:schemeClr val="dk1"/>
+          </a:fontRef>
+        </p:style>
+        <p:txBody>
+          <a:bodyPr tIns="105844" rtlCol="0" anchor="t"/>
+          <a:lstStyle/>
+          <a:p>
+            <a:pPr marL="0" lvl="1" defTabSz="672130"/>
+            <a:r>
+              <a:rPr lang="pt-BR" sz="1600" b="1" dirty="0">
+                <a:solidFill>
+                  <a:schemeClr val="tx1"/>
+                </a:solidFill>
+                <a:latin typeface="Exo 2 Medium" panose="00000600000000000000" pitchFamily="50" charset="0"/>
+                <a:cs typeface="Simplon BP Regular"/>
+              </a:rPr>
+              <a:t>Tela </a:t>
+            </a:r>
+            <a:r>
+              <a:rPr lang="pt-BR" sz="1600" b="1" dirty="0" err="1">
+                <a:solidFill>
+                  <a:schemeClr val="tx1"/>
+                </a:solidFill>
+                <a:latin typeface="Exo 2 Medium" panose="00000600000000000000" pitchFamily="50" charset="0"/>
+                <a:cs typeface="Simplon BP Regular"/>
+              </a:rPr>
+              <a:t>perfi</a:t>
+            </a:r>
+            <a:r>
+              <a:rPr lang="pt-BR" sz="1600" b="1" dirty="0">
+                <a:solidFill>
+                  <a:schemeClr val="tx1"/>
+                </a:solidFill>
+                <a:latin typeface="Exo 2 Medium" panose="00000600000000000000" pitchFamily="50" charset="0"/>
+                <a:cs typeface="Simplon BP Regular"/>
+              </a:rPr>
+              <a:t> e editar </a:t>
+            </a:r>
+            <a:r>
+              <a:rPr lang="pt-BR" sz="1600" b="1" dirty="0" err="1">
+                <a:solidFill>
+                  <a:schemeClr val="tx1"/>
+                </a:solidFill>
+                <a:latin typeface="Exo 2 Medium" panose="00000600000000000000" pitchFamily="50" charset="0"/>
+                <a:cs typeface="Simplon BP Regular"/>
+              </a:rPr>
+              <a:t>perfill</a:t>
+            </a:r>
+            <a:r>
+              <a:rPr lang="pt-BR" sz="1600" b="1" dirty="0">
+                <a:solidFill>
+                  <a:schemeClr val="tx1"/>
+                </a:solidFill>
+                <a:latin typeface="Exo 2 Medium" panose="00000600000000000000" pitchFamily="50" charset="0"/>
+                <a:cs typeface="Simplon BP Regular"/>
+              </a:rPr>
+              <a:t> </a:t>
+            </a:r>
+            <a:r>
+              <a:rPr lang="pt-BR" sz="1600" b="1" dirty="0" err="1">
+                <a:solidFill>
+                  <a:schemeClr val="tx1"/>
+                </a:solidFill>
+                <a:latin typeface="Exo 2 Medium" panose="00000600000000000000" pitchFamily="50" charset="0"/>
+                <a:cs typeface="Simplon BP Regular"/>
+              </a:rPr>
+              <a:t>codada</a:t>
+            </a:r>
+            <a:endParaRPr lang="pt-BR" sz="1600" b="1" dirty="0">
+              <a:solidFill>
+                <a:schemeClr val="tx1"/>
+              </a:solidFill>
+              <a:latin typeface="Exo 2 Medium" panose="00000600000000000000" pitchFamily="50" charset="0"/>
+              <a:cs typeface="Simplon BP Regular"/>
+            </a:endParaRPr>
+          </a:p>
+          <a:p>
+            <a:pPr marL="0" lvl="1" defTabSz="672130"/>
+            <a:r>
+              <a:rPr lang="pt-BR" sz="1600" dirty="0">
+                <a:solidFill>
+                  <a:schemeClr val="tx1"/>
+                </a:solidFill>
+                <a:latin typeface="Exo 2 Medium" panose="00000600000000000000" pitchFamily="50" charset="0"/>
+                <a:cs typeface="Simplon BP Regular"/>
+              </a:rPr>
+              <a:t>#João Oliveira</a:t>
+            </a:r>
+          </a:p>
+          <a:p>
+            <a:pPr fontAlgn="base">
+              <a:spcBef>
+                <a:spcPct val="0"/>
+              </a:spcBef>
+              <a:defRPr/>
+            </a:pPr>
+            <a:endParaRPr lang="pt-BR" sz="1323" b="1" dirty="0">
+              <a:solidFill>
+                <a:schemeClr val="tx1"/>
+              </a:solidFill>
+              <a:latin typeface="Exo 2 Medium" panose="00000600000000000000" pitchFamily="50" charset="0"/>
+              <a:cs typeface="Simplon BP Regular"/>
+            </a:endParaRPr>
+          </a:p>
+          <a:p>
+            <a:pPr fontAlgn="base">
+              <a:spcBef>
+                <a:spcPct val="0"/>
+              </a:spcBef>
+              <a:defRPr/>
+            </a:pPr>
+            <a:endParaRPr lang="pt-BR" sz="1323" b="1" dirty="0">
+              <a:solidFill>
+                <a:schemeClr val="tx1"/>
+              </a:solidFill>
+              <a:latin typeface="Exo 2 Medium" panose="00000600000000000000" pitchFamily="50" charset="0"/>
+              <a:cs typeface="Simplon BP Regular"/>
+            </a:endParaRPr>
+          </a:p>
+        </p:txBody>
+      </p:sp>
+      <p:sp>
+        <p:nvSpPr>
+          <p:cNvPr id="33" name="Rectangle 43">
+            <a:extLst>
+              <a:ext uri="{FF2B5EF4-FFF2-40B4-BE49-F238E27FC236}">
+                <a16:creationId xmlns:a16="http://schemas.microsoft.com/office/drawing/2014/main" id="{F0F9D098-FF4D-4A23-BBE2-370207E68022}"/>
+              </a:ext>
+            </a:extLst>
+          </p:cNvPr>
+          <p:cNvSpPr>
+            <a:spLocks/>
+          </p:cNvSpPr>
+          <p:nvPr/>
+        </p:nvSpPr>
+        <p:spPr>
+          <a:xfrm>
+            <a:off x="512766" y="4500711"/>
+            <a:ext cx="12496525" cy="2808978"/>
+          </a:xfrm>
+          <a:prstGeom prst="rect">
+            <a:avLst/>
+          </a:prstGeom>
+          <a:noFill/>
+          <a:ln w="12700">
+            <a:solidFill>
+              <a:schemeClr val="bg1">
+                <a:lumMod val="50000"/>
+              </a:schemeClr>
+            </a:solidFill>
+          </a:ln>
+        </p:spPr>
+        <p:style>
+          <a:lnRef idx="2">
+            <a:schemeClr val="accent4"/>
+          </a:lnRef>
+          <a:fillRef idx="1">
+            <a:schemeClr val="lt1"/>
+          </a:fillRef>
+          <a:effectRef idx="0">
+            <a:schemeClr val="accent4"/>
+          </a:effectRef>
+          <a:fontRef idx="minor">
+            <a:schemeClr val="dk1"/>
+          </a:fontRef>
+        </p:style>
+        <p:txBody>
+          <a:bodyPr wrap="square" tIns="105844" numCol="3" rtlCol="0" anchor="t"/>
+          <a:lstStyle/>
+          <a:p>
+            <a:pPr marL="0" lvl="1" defTabSz="672130"/>
+            <a:r>
+              <a:rPr lang="pt-BR" sz="1600" b="1" dirty="0">
+                <a:solidFill>
+                  <a:schemeClr val="tx1"/>
+                </a:solidFill>
+                <a:latin typeface="Exo 2 Medium" panose="00000600000000000000" pitchFamily="50" charset="0"/>
+                <a:cs typeface="Simplon BP Regular"/>
+              </a:rPr>
+              <a:t>LLD                                                                                                       </a:t>
+            </a:r>
+          </a:p>
+          <a:p>
+            <a:pPr marL="0" lvl="1" defTabSz="672130"/>
+            <a:r>
+              <a:rPr lang="pt-BR" sz="1600" dirty="0">
+                <a:solidFill>
+                  <a:schemeClr val="tx1"/>
+                </a:solidFill>
+                <a:latin typeface="Exo 2 Medium" panose="00000600000000000000" pitchFamily="50" charset="0"/>
+                <a:cs typeface="Simplon BP Regular"/>
+              </a:rPr>
+              <a:t>#Todo o grupo (para conhecimento geral)</a:t>
+            </a:r>
+          </a:p>
+          <a:p>
+            <a:pPr marL="0" lvl="1" defTabSz="672130"/>
+            <a:endParaRPr lang="pt-BR" sz="1600" dirty="0">
+              <a:solidFill>
+                <a:schemeClr val="tx1"/>
+              </a:solidFill>
+              <a:latin typeface="Exo 2 Medium" panose="00000600000000000000" pitchFamily="50" charset="0"/>
+              <a:cs typeface="Simplon BP Regular"/>
+            </a:endParaRPr>
+          </a:p>
+          <a:p>
+            <a:pPr marL="0" lvl="1" defTabSz="672130"/>
+            <a:r>
+              <a:rPr lang="pt-BR" sz="1600" b="1" dirty="0">
+                <a:solidFill>
+                  <a:schemeClr val="tx1"/>
+                </a:solidFill>
+                <a:latin typeface="Exo 2 Medium" panose="00000600000000000000" pitchFamily="50" charset="0"/>
+                <a:cs typeface="Simplon BP Regular"/>
+              </a:rPr>
+              <a:t>PPT com todas as informações                                                                                                    </a:t>
+            </a:r>
+          </a:p>
+          <a:p>
+            <a:pPr marL="0" lvl="1" defTabSz="672130"/>
+            <a:r>
+              <a:rPr lang="pt-BR" sz="1600" dirty="0">
+                <a:solidFill>
+                  <a:schemeClr val="tx1"/>
+                </a:solidFill>
+                <a:latin typeface="Exo 2 Medium" panose="00000600000000000000" pitchFamily="50" charset="0"/>
+                <a:cs typeface="Simplon BP Regular"/>
+              </a:rPr>
+              <a:t>#Vinícius Novais</a:t>
+            </a:r>
+          </a:p>
+          <a:p>
+            <a:pPr marL="0" lvl="1" defTabSz="672130"/>
+            <a:endParaRPr lang="pt-BR" sz="1600" dirty="0">
+              <a:solidFill>
+                <a:schemeClr val="tx1"/>
+              </a:solidFill>
+              <a:latin typeface="Exo 2 Medium" panose="00000600000000000000" pitchFamily="50" charset="0"/>
+              <a:cs typeface="Simplon BP Regular"/>
+            </a:endParaRPr>
+          </a:p>
+          <a:p>
+            <a:pPr marL="0" lvl="1" defTabSz="672130"/>
+            <a:endParaRPr lang="pt-BR" sz="1600" dirty="0">
+              <a:solidFill>
+                <a:schemeClr val="tx1"/>
+              </a:solidFill>
+              <a:latin typeface="Exo 2 Medium" panose="00000600000000000000" pitchFamily="50" charset="0"/>
+              <a:cs typeface="Simplon BP Regular"/>
+            </a:endParaRPr>
+          </a:p>
+          <a:p>
+            <a:pPr marL="0" lvl="1" defTabSz="672130"/>
+            <a:endParaRPr lang="pt-BR" sz="1600" dirty="0">
+              <a:solidFill>
+                <a:schemeClr val="tx1"/>
+              </a:solidFill>
+              <a:latin typeface="Exo 2 Medium" panose="00000600000000000000" pitchFamily="50" charset="0"/>
+              <a:cs typeface="Simplon BP Regular"/>
+            </a:endParaRPr>
+          </a:p>
+          <a:p>
+            <a:pPr marL="0" lvl="1" defTabSz="672130"/>
+            <a:endParaRPr lang="pt-BR" sz="1600" dirty="0">
+              <a:solidFill>
+                <a:schemeClr val="tx1"/>
+              </a:solidFill>
+              <a:latin typeface="Exo 2 Medium" panose="00000600000000000000" pitchFamily="50" charset="0"/>
+              <a:cs typeface="Simplon BP Regular"/>
+            </a:endParaRPr>
+          </a:p>
+          <a:p>
+            <a:pPr marL="0" lvl="1" defTabSz="672130"/>
+            <a:endParaRPr lang="pt-BR" sz="1600" b="1" dirty="0">
+              <a:solidFill>
+                <a:schemeClr val="tx1"/>
+              </a:solidFill>
+              <a:latin typeface="Exo 2 Medium" panose="00000600000000000000" pitchFamily="50" charset="0"/>
+              <a:cs typeface="Simplon BP Regular"/>
+            </a:endParaRPr>
+          </a:p>
+          <a:p>
+            <a:pPr marL="0" lvl="1" defTabSz="672130"/>
+            <a:endParaRPr lang="pt-BR" sz="1323" b="1" dirty="0">
+              <a:solidFill>
+                <a:schemeClr val="tx1"/>
+              </a:solidFill>
+              <a:latin typeface="Exo 2 Medium" panose="00000600000000000000" pitchFamily="50" charset="0"/>
+              <a:cs typeface="Simplon BP Regular"/>
+            </a:endParaRPr>
+          </a:p>
+          <a:p>
+            <a:pPr marL="0" lvl="1" defTabSz="672130"/>
+            <a:endParaRPr lang="pt-BR" sz="1323" b="1" dirty="0">
+              <a:solidFill>
+                <a:schemeClr val="tx1"/>
+              </a:solidFill>
+              <a:latin typeface="Exo 2 Medium" panose="00000600000000000000" pitchFamily="50" charset="0"/>
+              <a:cs typeface="Simplon BP Regular"/>
+            </a:endParaRPr>
+          </a:p>
+          <a:p>
+            <a:pPr marL="0" lvl="1" defTabSz="672130"/>
+            <a:endParaRPr lang="pt-BR" sz="1323" b="1" dirty="0">
+              <a:solidFill>
+                <a:schemeClr val="tx1"/>
+              </a:solidFill>
+              <a:latin typeface="Exo 2 Medium" panose="00000600000000000000" pitchFamily="50" charset="0"/>
+              <a:cs typeface="Simplon BP Regular"/>
+            </a:endParaRPr>
+          </a:p>
+          <a:p>
+            <a:pPr marL="0" lvl="1" defTabSz="672130"/>
+            <a:endParaRPr lang="pt-BR" sz="1600" dirty="0">
+              <a:solidFill>
+                <a:schemeClr val="tx1"/>
+              </a:solidFill>
+              <a:latin typeface="Exo 2 Medium" panose="00000600000000000000" pitchFamily="50" charset="0"/>
+              <a:cs typeface="Simplon BP Regular"/>
+            </a:endParaRPr>
+          </a:p>
+          <a:p>
+            <a:pPr marL="0" lvl="1" defTabSz="672130"/>
+            <a:endParaRPr lang="pt-BR" sz="1600" b="1" dirty="0">
+              <a:solidFill>
+                <a:schemeClr val="tx1"/>
+              </a:solidFill>
+              <a:latin typeface="Exo 2 Medium" panose="00000600000000000000" pitchFamily="50" charset="0"/>
+              <a:cs typeface="Simplon BP Regular"/>
+            </a:endParaRPr>
+          </a:p>
+          <a:p>
+            <a:pPr marL="0" lvl="1" defTabSz="672130"/>
+            <a:endParaRPr lang="pt-BR" sz="1323" b="1" dirty="0">
+              <a:solidFill>
+                <a:schemeClr val="tx1"/>
+              </a:solidFill>
+              <a:latin typeface="Exo 2 Medium" panose="00000600000000000000" pitchFamily="50" charset="0"/>
+              <a:cs typeface="Simplon BP Regular"/>
+            </a:endParaRPr>
+          </a:p>
+          <a:p>
+            <a:pPr marL="0" lvl="1" defTabSz="672130"/>
+            <a:endParaRPr lang="pt-BR" sz="1323" b="1" dirty="0">
+              <a:solidFill>
+                <a:schemeClr val="tx1"/>
+              </a:solidFill>
+              <a:latin typeface="Exo 2 Medium" panose="00000600000000000000" pitchFamily="50" charset="0"/>
+              <a:cs typeface="Simplon BP Regular"/>
+            </a:endParaRPr>
+          </a:p>
+          <a:p>
+            <a:pPr marL="0" lvl="1" defTabSz="672130"/>
+            <a:endParaRPr lang="pt-BR" sz="1323" b="1" dirty="0">
+              <a:solidFill>
+                <a:schemeClr val="tx1"/>
+              </a:solidFill>
+              <a:latin typeface="Exo 2 Medium" panose="00000600000000000000" pitchFamily="50" charset="0"/>
+              <a:cs typeface="Simplon BP Regular"/>
+            </a:endParaRPr>
+          </a:p>
+        </p:txBody>
+      </p:sp>
+      <p:sp>
+        <p:nvSpPr>
+          <p:cNvPr id="34" name="Oval 134">
+            <a:extLst>
+              <a:ext uri="{FF2B5EF4-FFF2-40B4-BE49-F238E27FC236}">
+                <a16:creationId xmlns:a16="http://schemas.microsoft.com/office/drawing/2014/main" id="{B57AA8A8-84FD-48DE-BA43-08D253C6F275}"/>
+              </a:ext>
+            </a:extLst>
+          </p:cNvPr>
+          <p:cNvSpPr>
+            <a:spLocks noChangeAspect="1"/>
+          </p:cNvSpPr>
+          <p:nvPr/>
+        </p:nvSpPr>
+        <p:spPr>
+          <a:xfrm>
+            <a:off x="9287916" y="297930"/>
+            <a:ext cx="211404" cy="211689"/>
+          </a:xfrm>
+          <a:prstGeom prst="ellipse">
+            <a:avLst/>
+          </a:prstGeom>
+          <a:solidFill>
+            <a:srgbClr val="1BCF13"/>
+          </a:solidFill>
+          <a:ln w="12700">
+            <a:solidFill>
+              <a:schemeClr val="accent3"/>
+            </a:solidFill>
+          </a:ln>
+        </p:spPr>
+        <p:style>
+          <a:lnRef idx="2">
+            <a:schemeClr val="accent1">
+              <a:shade val="50000"/>
+            </a:schemeClr>
+          </a:lnRef>
+          <a:fillRef idx="1">
+            <a:schemeClr val="accent1"/>
+          </a:fillRef>
+          <a:effectRef idx="0">
+            <a:schemeClr val="accent1"/>
+          </a:effectRef>
+          <a:fontRef idx="minor">
+            <a:schemeClr val="lt1"/>
+          </a:fontRef>
+        </p:style>
+        <p:txBody>
+          <a:bodyPr wrap="none" lIns="52922" tIns="52922" rIns="52922" rtlCol="0" anchor="ctr"/>
+          <a:lstStyle/>
+          <a:p>
+            <a:pPr algn="ctr" defTabSz="672130"/>
+            <a:endParaRPr lang="en-US" sz="1176" dirty="0">
+              <a:solidFill>
+                <a:srgbClr val="00B050"/>
+              </a:solidFill>
+              <a:latin typeface="Exo 2 Medium" panose="00000600000000000000" pitchFamily="50" charset="0"/>
+              <a:cs typeface="Simplon BP Regular"/>
+            </a:endParaRPr>
+          </a:p>
+        </p:txBody>
+      </p:sp>
+      <p:sp>
+        <p:nvSpPr>
+          <p:cNvPr id="35" name="Oval 120">
+            <a:extLst>
+              <a:ext uri="{FF2B5EF4-FFF2-40B4-BE49-F238E27FC236}">
+                <a16:creationId xmlns:a16="http://schemas.microsoft.com/office/drawing/2014/main" id="{DAAADCBD-ECD9-4B5D-A8E0-075FB6F9BED7}"/>
+              </a:ext>
+            </a:extLst>
+          </p:cNvPr>
+          <p:cNvSpPr>
+            <a:spLocks noChangeAspect="1"/>
+          </p:cNvSpPr>
+          <p:nvPr/>
+        </p:nvSpPr>
+        <p:spPr>
+          <a:xfrm>
+            <a:off x="10188056" y="324247"/>
+            <a:ext cx="211404" cy="211689"/>
+          </a:xfrm>
+          <a:prstGeom prst="ellipse">
+            <a:avLst/>
+          </a:prstGeom>
+          <a:solidFill>
+            <a:schemeClr val="accent4">
+              <a:lumMod val="25000"/>
+              <a:lumOff val="75000"/>
+            </a:schemeClr>
+          </a:solidFill>
+          <a:ln w="12700">
+            <a:solidFill>
+              <a:schemeClr val="accent3"/>
+            </a:solidFill>
+          </a:ln>
+        </p:spPr>
+        <p:style>
+          <a:lnRef idx="2">
+            <a:schemeClr val="accent1">
+              <a:shade val="50000"/>
+            </a:schemeClr>
+          </a:lnRef>
+          <a:fillRef idx="1">
+            <a:schemeClr val="accent1"/>
+          </a:fillRef>
+          <a:effectRef idx="0">
+            <a:schemeClr val="accent1"/>
+          </a:effectRef>
+          <a:fontRef idx="minor">
+            <a:schemeClr val="lt1"/>
+          </a:fontRef>
+        </p:style>
+        <p:txBody>
+          <a:bodyPr wrap="none" lIns="52922" tIns="52922" rIns="52922" rtlCol="0" anchor="ctr"/>
+          <a:lstStyle/>
+          <a:p>
+            <a:pPr algn="ctr" defTabSz="672130"/>
+            <a:endParaRPr lang="en-US" sz="1176" dirty="0">
+              <a:solidFill>
+                <a:srgbClr val="1BCF13"/>
+              </a:solidFill>
+              <a:latin typeface="Exo 2 Medium" panose="00000600000000000000" pitchFamily="50" charset="0"/>
+              <a:cs typeface="Simplon BP Regular"/>
+            </a:endParaRPr>
+          </a:p>
+        </p:txBody>
+      </p:sp>
+      <p:sp>
+        <p:nvSpPr>
+          <p:cNvPr id="36" name="Retângulo 35">
+            <a:extLst>
+              <a:ext uri="{FF2B5EF4-FFF2-40B4-BE49-F238E27FC236}">
+                <a16:creationId xmlns:a16="http://schemas.microsoft.com/office/drawing/2014/main" id="{A87B1CA7-18E0-459A-8B40-B30CC45C209A}"/>
+              </a:ext>
+            </a:extLst>
+          </p:cNvPr>
+          <p:cNvSpPr/>
+          <p:nvPr/>
+        </p:nvSpPr>
+        <p:spPr>
+          <a:xfrm>
+            <a:off x="8017619" y="209534"/>
+            <a:ext cx="4937689" cy="618769"/>
+          </a:xfrm>
+          <a:prstGeom prst="rect">
+            <a:avLst/>
+          </a:prstGeom>
+          <a:noFill/>
+          <a:ln w="6350">
+            <a:solidFill>
+              <a:schemeClr val="bg1">
+                <a:lumMod val="75000"/>
+              </a:schemeClr>
+            </a:solidFill>
+          </a:ln>
+        </p:spPr>
+        <p:style>
+          <a:lnRef idx="2">
+            <a:schemeClr val="accent1">
+              <a:shade val="50000"/>
+            </a:schemeClr>
+          </a:lnRef>
+          <a:fillRef idx="1">
+            <a:schemeClr val="accent1"/>
+          </a:fillRef>
+          <a:effectRef idx="0">
+            <a:schemeClr val="accent1"/>
+          </a:effectRef>
+          <a:fontRef idx="minor">
+            <a:schemeClr val="lt1"/>
+          </a:fontRef>
+        </p:style>
+        <p:txBody>
+          <a:bodyPr rtlCol="0" anchor="ctr"/>
+          <a:lstStyle/>
+          <a:p>
+            <a:pPr algn="ctr"/>
+            <a:endParaRPr lang="pt-BR">
+              <a:latin typeface="Exo 2 Medium" panose="00000600000000000000" pitchFamily="50" charset="0"/>
+            </a:endParaRPr>
+          </a:p>
+        </p:txBody>
+      </p:sp>
+      <p:sp>
+        <p:nvSpPr>
+          <p:cNvPr id="37" name="TextBox 138">
+            <a:extLst>
+              <a:ext uri="{FF2B5EF4-FFF2-40B4-BE49-F238E27FC236}">
+                <a16:creationId xmlns:a16="http://schemas.microsoft.com/office/drawing/2014/main" id="{41B46BEE-7CCD-459E-800A-B6E0E71F7FC7}"/>
+              </a:ext>
+            </a:extLst>
+          </p:cNvPr>
+          <p:cNvSpPr txBox="1"/>
+          <p:nvPr/>
+        </p:nvSpPr>
+        <p:spPr>
+          <a:xfrm>
+            <a:off x="9715810" y="51570"/>
+            <a:ext cx="1478088" cy="211688"/>
+          </a:xfrm>
+          <a:prstGeom prst="rect">
+            <a:avLst/>
+          </a:prstGeom>
+          <a:solidFill>
+            <a:schemeClr val="bg1"/>
+          </a:solidFill>
+          <a:ln w="12700">
+            <a:noFill/>
+          </a:ln>
+        </p:spPr>
+        <p:style>
+          <a:lnRef idx="2">
+            <a:schemeClr val="accent4"/>
+          </a:lnRef>
+          <a:fillRef idx="1">
+            <a:schemeClr val="lt1"/>
+          </a:fillRef>
+          <a:effectRef idx="0">
+            <a:schemeClr val="accent4"/>
+          </a:effectRef>
+          <a:fontRef idx="minor">
+            <a:schemeClr val="dk1"/>
+          </a:fontRef>
+        </p:style>
+        <p:txBody>
+          <a:bodyPr wrap="none" lIns="52922" tIns="52922" rIns="52922" bIns="0" rtlCol="0" anchor="b"/>
+          <a:lstStyle>
+            <a:defPPr>
+              <a:defRPr lang="en-US"/>
+            </a:defPPr>
+            <a:lvl1pPr algn="ctr">
+              <a:defRPr sz="1000" b="1">
+                <a:latin typeface="Simplon BP Regular"/>
+                <a:cs typeface="Simplon BP Regular"/>
+              </a:defRPr>
+            </a:lvl1pPr>
+            <a:lvl2pPr>
+              <a:defRPr>
+                <a:solidFill>
+                  <a:schemeClr val="dk1"/>
+                </a:solidFill>
+              </a:defRPr>
+            </a:lvl2pPr>
+            <a:lvl3pPr>
+              <a:defRPr>
+                <a:solidFill>
+                  <a:schemeClr val="dk1"/>
+                </a:solidFill>
+              </a:defRPr>
+            </a:lvl3pPr>
+            <a:lvl4pPr>
+              <a:defRPr>
+                <a:solidFill>
+                  <a:schemeClr val="dk1"/>
+                </a:solidFill>
+              </a:defRPr>
+            </a:lvl4pPr>
+            <a:lvl5pPr>
+              <a:defRPr>
+                <a:solidFill>
+                  <a:schemeClr val="dk1"/>
+                </a:solidFill>
+              </a:defRPr>
+            </a:lvl5pPr>
+            <a:lvl6pPr>
+              <a:defRPr>
+                <a:solidFill>
+                  <a:schemeClr val="dk1"/>
+                </a:solidFill>
+              </a:defRPr>
+            </a:lvl6pPr>
+            <a:lvl7pPr>
+              <a:defRPr>
+                <a:solidFill>
+                  <a:schemeClr val="dk1"/>
+                </a:solidFill>
+              </a:defRPr>
+            </a:lvl7pPr>
+            <a:lvl8pPr>
+              <a:defRPr>
+                <a:solidFill>
+                  <a:schemeClr val="dk1"/>
+                </a:solidFill>
+              </a:defRPr>
+            </a:lvl8pPr>
+            <a:lvl9pPr>
+              <a:defRPr>
+                <a:solidFill>
+                  <a:schemeClr val="dk1"/>
+                </a:solidFill>
+              </a:defRPr>
+            </a:lvl9pPr>
+          </a:lstStyle>
+          <a:p>
+            <a:pPr defTabSz="672130"/>
+            <a:r>
+              <a:rPr lang="en-US" sz="1176" dirty="0">
+                <a:solidFill>
+                  <a:srgbClr val="08276B"/>
+                </a:solidFill>
+                <a:latin typeface="Exo 2 Medium" panose="00000600000000000000" pitchFamily="50" charset="0"/>
+              </a:rPr>
+              <a:t>    </a:t>
+            </a:r>
+            <a:r>
+              <a:rPr lang="en-US" sz="1176" dirty="0" err="1">
+                <a:solidFill>
+                  <a:srgbClr val="08276B"/>
+                </a:solidFill>
+                <a:latin typeface="Exo 2 Medium" panose="00000600000000000000" pitchFamily="50" charset="0"/>
+              </a:rPr>
+              <a:t>Farol</a:t>
+            </a:r>
+            <a:r>
+              <a:rPr lang="en-US" sz="1176" dirty="0">
+                <a:solidFill>
+                  <a:srgbClr val="08276B"/>
+                </a:solidFill>
+                <a:latin typeface="Exo 2 Medium" panose="00000600000000000000" pitchFamily="50" charset="0"/>
+              </a:rPr>
+              <a:t> do </a:t>
+            </a:r>
+            <a:r>
+              <a:rPr lang="en-US" sz="1176" dirty="0" err="1">
+                <a:solidFill>
+                  <a:srgbClr val="08276B"/>
+                </a:solidFill>
+                <a:latin typeface="Exo 2 Medium" panose="00000600000000000000" pitchFamily="50" charset="0"/>
+              </a:rPr>
+              <a:t>Projeto</a:t>
+            </a:r>
+            <a:r>
+              <a:rPr lang="en-US" sz="1176" dirty="0">
+                <a:solidFill>
+                  <a:srgbClr val="08276B"/>
+                </a:solidFill>
+                <a:latin typeface="Exo 2 Medium" panose="00000600000000000000" pitchFamily="50" charset="0"/>
+              </a:rPr>
+              <a:t>   </a:t>
+            </a:r>
+          </a:p>
+        </p:txBody>
+      </p:sp>
+      <p:sp>
+        <p:nvSpPr>
+          <p:cNvPr id="38" name="Oval 134">
+            <a:extLst>
+              <a:ext uri="{FF2B5EF4-FFF2-40B4-BE49-F238E27FC236}">
+                <a16:creationId xmlns:a16="http://schemas.microsoft.com/office/drawing/2014/main" id="{AC71B70F-2DA1-4D18-9AC0-DCFDF0FE0D5C}"/>
+              </a:ext>
+            </a:extLst>
+          </p:cNvPr>
+          <p:cNvSpPr>
+            <a:spLocks noChangeAspect="1"/>
+          </p:cNvSpPr>
+          <p:nvPr/>
+        </p:nvSpPr>
+        <p:spPr>
+          <a:xfrm>
+            <a:off x="12166910" y="328582"/>
+            <a:ext cx="211404" cy="211689"/>
+          </a:xfrm>
+          <a:prstGeom prst="ellipse">
+            <a:avLst/>
+          </a:prstGeom>
+          <a:solidFill>
+            <a:srgbClr val="1BCF13"/>
+          </a:solidFill>
+          <a:ln w="12700">
+            <a:solidFill>
+              <a:schemeClr val="accent3"/>
+            </a:solidFill>
+          </a:ln>
+        </p:spPr>
+        <p:style>
+          <a:lnRef idx="2">
+            <a:schemeClr val="accent1">
+              <a:shade val="50000"/>
+            </a:schemeClr>
+          </a:lnRef>
+          <a:fillRef idx="1">
+            <a:schemeClr val="accent1"/>
+          </a:fillRef>
+          <a:effectRef idx="0">
+            <a:schemeClr val="accent1"/>
+          </a:effectRef>
+          <a:fontRef idx="minor">
+            <a:schemeClr val="lt1"/>
+          </a:fontRef>
+        </p:style>
+        <p:txBody>
+          <a:bodyPr wrap="none" lIns="52922" tIns="52922" rIns="52922" rtlCol="0" anchor="ctr"/>
+          <a:lstStyle/>
+          <a:p>
+            <a:pPr algn="ctr" defTabSz="672130"/>
+            <a:endParaRPr lang="en-US" sz="1176" dirty="0">
+              <a:solidFill>
+                <a:srgbClr val="FFC000"/>
+              </a:solidFill>
+              <a:latin typeface="Exo 2 Medium" panose="00000600000000000000" pitchFamily="50" charset="0"/>
+              <a:cs typeface="Simplon BP Regular"/>
+            </a:endParaRPr>
+          </a:p>
+        </p:txBody>
+      </p:sp>
+      <p:sp>
+        <p:nvSpPr>
+          <p:cNvPr id="4" name="TextBox 3">
+            <a:extLst>
+              <a:ext uri="{FF2B5EF4-FFF2-40B4-BE49-F238E27FC236}">
+                <a16:creationId xmlns:a16="http://schemas.microsoft.com/office/drawing/2014/main" id="{9F47C350-4CB5-466C-B2DC-CBD9ED7F64B2}"/>
+              </a:ext>
+            </a:extLst>
+          </p:cNvPr>
+          <p:cNvSpPr txBox="1"/>
+          <p:nvPr/>
+        </p:nvSpPr>
+        <p:spPr>
+          <a:xfrm>
+            <a:off x="6865491" y="1153210"/>
+            <a:ext cx="4553106" cy="338554"/>
+          </a:xfrm>
+          <a:prstGeom prst="rect">
+            <a:avLst/>
+          </a:prstGeom>
+          <a:noFill/>
+        </p:spPr>
+        <p:txBody>
+          <a:bodyPr wrap="none" rtlCol="0">
+            <a:spAutoFit/>
+          </a:bodyPr>
+          <a:lstStyle/>
+          <a:p>
+            <a:r>
+              <a:rPr lang="pt-BR" sz="1600" dirty="0">
+                <a:latin typeface="Exo 2 Medium" panose="00000600000000000000"/>
+              </a:rPr>
+              <a:t>Atenção ao prazo combinado para entrega das tasks.</a:t>
+            </a:r>
+          </a:p>
+        </p:txBody>
+      </p:sp>
+      <p:sp>
+        <p:nvSpPr>
+          <p:cNvPr id="43" name="TextBox 42">
+            <a:extLst>
+              <a:ext uri="{FF2B5EF4-FFF2-40B4-BE49-F238E27FC236}">
+                <a16:creationId xmlns:a16="http://schemas.microsoft.com/office/drawing/2014/main" id="{B00F4A3F-EDE2-489C-8C3A-91F9B7B75AAD}"/>
+              </a:ext>
+            </a:extLst>
+          </p:cNvPr>
+          <p:cNvSpPr txBox="1"/>
+          <p:nvPr/>
+        </p:nvSpPr>
+        <p:spPr>
+          <a:xfrm>
+            <a:off x="496766" y="1783310"/>
+            <a:ext cx="6734012" cy="584775"/>
+          </a:xfrm>
+          <a:prstGeom prst="rect">
+            <a:avLst/>
+          </a:prstGeom>
+          <a:noFill/>
+        </p:spPr>
+        <p:txBody>
+          <a:bodyPr wrap="square">
+            <a:spAutoFit/>
+          </a:bodyPr>
+          <a:lstStyle/>
+          <a:p>
+            <a:r>
+              <a:rPr lang="pt-BR" sz="1600" b="1" dirty="0">
+                <a:latin typeface="Exo 2 Medium" panose="00000600000000000000"/>
+              </a:rPr>
+              <a:t>Tela projetos </a:t>
+            </a:r>
+            <a:r>
+              <a:rPr lang="pt-BR" sz="1600" b="1" dirty="0" err="1">
+                <a:latin typeface="Exo 2 Medium" panose="00000600000000000000"/>
+              </a:rPr>
+              <a:t>codada</a:t>
+            </a:r>
+            <a:endParaRPr lang="pt-BR" sz="1600" b="1" dirty="0">
+              <a:latin typeface="Exo 2 Medium" panose="00000600000000000000"/>
+            </a:endParaRPr>
+          </a:p>
+          <a:p>
+            <a:r>
+              <a:rPr lang="pt-BR" sz="1600" dirty="0">
+                <a:latin typeface="Exo 2 Medium" panose="00000600000000000000"/>
+              </a:rPr>
+              <a:t>#Caio Elcio</a:t>
+            </a:r>
+          </a:p>
+        </p:txBody>
+      </p:sp>
+      <p:sp>
+        <p:nvSpPr>
+          <p:cNvPr id="40" name="TextBox 39">
+            <a:extLst>
+              <a:ext uri="{FF2B5EF4-FFF2-40B4-BE49-F238E27FC236}">
+                <a16:creationId xmlns:a16="http://schemas.microsoft.com/office/drawing/2014/main" id="{4B72F105-FFC8-4FEA-A709-130DB99E3B41}"/>
+              </a:ext>
+            </a:extLst>
+          </p:cNvPr>
+          <p:cNvSpPr txBox="1"/>
+          <p:nvPr/>
+        </p:nvSpPr>
+        <p:spPr>
+          <a:xfrm>
+            <a:off x="3659871" y="1908423"/>
+            <a:ext cx="6734012" cy="584775"/>
+          </a:xfrm>
+          <a:prstGeom prst="rect">
+            <a:avLst/>
+          </a:prstGeom>
+          <a:noFill/>
+        </p:spPr>
+        <p:txBody>
+          <a:bodyPr wrap="square">
+            <a:spAutoFit/>
+          </a:bodyPr>
+          <a:lstStyle/>
+          <a:p>
+            <a:r>
+              <a:rPr lang="pt-BR" sz="1600" b="1" dirty="0">
+                <a:latin typeface="Exo 2 Medium" panose="00000600000000000000"/>
+              </a:rPr>
+              <a:t>Tela planos codada (task atrasada)</a:t>
+            </a:r>
+          </a:p>
+          <a:p>
+            <a:r>
+              <a:rPr lang="pt-BR" sz="1600" dirty="0">
+                <a:latin typeface="Exo 2 Medium" panose="00000600000000000000"/>
+              </a:rPr>
+              <a:t>#Lucas Ferreira</a:t>
+            </a:r>
+          </a:p>
+        </p:txBody>
+      </p:sp>
+      <p:sp>
+        <p:nvSpPr>
+          <p:cNvPr id="39" name="TextBox 38">
+            <a:extLst>
+              <a:ext uri="{FF2B5EF4-FFF2-40B4-BE49-F238E27FC236}">
+                <a16:creationId xmlns:a16="http://schemas.microsoft.com/office/drawing/2014/main" id="{EB78EF16-BB72-4778-B7F6-94D832528375}"/>
+              </a:ext>
+            </a:extLst>
+          </p:cNvPr>
+          <p:cNvSpPr txBox="1"/>
+          <p:nvPr/>
+        </p:nvSpPr>
+        <p:spPr>
+          <a:xfrm>
+            <a:off x="3665448" y="1164256"/>
+            <a:ext cx="6734012" cy="584775"/>
+          </a:xfrm>
+          <a:prstGeom prst="rect">
+            <a:avLst/>
+          </a:prstGeom>
+          <a:noFill/>
+        </p:spPr>
+        <p:txBody>
+          <a:bodyPr wrap="square">
+            <a:spAutoFit/>
+          </a:bodyPr>
+          <a:lstStyle/>
+          <a:p>
+            <a:pPr marL="0" lvl="1" defTabSz="672130"/>
+            <a:r>
+              <a:rPr lang="pt-BR" sz="1600" b="1" dirty="0">
+                <a:solidFill>
+                  <a:schemeClr val="tx1"/>
+                </a:solidFill>
+                <a:latin typeface="Exo 2 Medium" panose="00000600000000000000" pitchFamily="50" charset="0"/>
+                <a:cs typeface="Simplon BP Regular"/>
+              </a:rPr>
+              <a:t>Tela feed codada (task atrasada)</a:t>
+            </a:r>
+          </a:p>
+          <a:p>
+            <a:pPr marL="0" lvl="1" defTabSz="672130"/>
+            <a:r>
+              <a:rPr lang="pt-BR" sz="1600" dirty="0">
+                <a:solidFill>
+                  <a:schemeClr val="tx1"/>
+                </a:solidFill>
+                <a:latin typeface="Exo 2 Medium" panose="00000600000000000000" pitchFamily="50" charset="0"/>
+                <a:cs typeface="Simplon BP Regular"/>
+              </a:rPr>
+              <a:t>#Lucas Felix</a:t>
+            </a:r>
+          </a:p>
+        </p:txBody>
+      </p:sp>
+      <p:sp>
+        <p:nvSpPr>
+          <p:cNvPr id="41" name="TextBox 40">
+            <a:extLst>
+              <a:ext uri="{FF2B5EF4-FFF2-40B4-BE49-F238E27FC236}">
+                <a16:creationId xmlns:a16="http://schemas.microsoft.com/office/drawing/2014/main" id="{793BD65D-A330-49DB-A661-F7C2F30C8E5B}"/>
+              </a:ext>
+            </a:extLst>
+          </p:cNvPr>
+          <p:cNvSpPr txBox="1"/>
+          <p:nvPr/>
+        </p:nvSpPr>
+        <p:spPr>
+          <a:xfrm>
+            <a:off x="6865491" y="1476375"/>
+            <a:ext cx="6734012" cy="338554"/>
+          </a:xfrm>
+          <a:prstGeom prst="rect">
+            <a:avLst/>
+          </a:prstGeom>
+          <a:noFill/>
+        </p:spPr>
+        <p:txBody>
+          <a:bodyPr wrap="square">
+            <a:spAutoFit/>
+          </a:bodyPr>
+          <a:lstStyle/>
+          <a:p>
+            <a:pPr marL="0" lvl="1" defTabSz="672130"/>
+            <a:r>
+              <a:rPr lang="pt-BR" sz="1600" dirty="0">
+                <a:solidFill>
+                  <a:schemeClr val="tx1"/>
+                </a:solidFill>
+                <a:latin typeface="Exo 2 Medium" panose="00000600000000000000" pitchFamily="50" charset="0"/>
+                <a:cs typeface="Simplon BP Regular"/>
+              </a:rPr>
+              <a:t>Conversar com o professor sobre o LLD</a:t>
+            </a:r>
+          </a:p>
+        </p:txBody>
+      </p:sp>
+      <p:sp>
+        <p:nvSpPr>
+          <p:cNvPr id="42" name="Oval 134">
+            <a:extLst>
+              <a:ext uri="{FF2B5EF4-FFF2-40B4-BE49-F238E27FC236}">
+                <a16:creationId xmlns:a16="http://schemas.microsoft.com/office/drawing/2014/main" id="{26845ED0-DB74-4B4E-8D20-A0A53F48BAAD}"/>
+              </a:ext>
+            </a:extLst>
+          </p:cNvPr>
+          <p:cNvSpPr>
+            <a:spLocks noChangeAspect="1"/>
+          </p:cNvSpPr>
+          <p:nvPr/>
+        </p:nvSpPr>
+        <p:spPr>
+          <a:xfrm>
+            <a:off x="8443555" y="252239"/>
+            <a:ext cx="211404" cy="211689"/>
+          </a:xfrm>
+          <a:prstGeom prst="ellipse">
+            <a:avLst/>
+          </a:prstGeom>
+          <a:solidFill>
+            <a:srgbClr val="1BCF13"/>
+          </a:solidFill>
+          <a:ln w="12700">
+            <a:solidFill>
+              <a:schemeClr val="accent3"/>
+            </a:solidFill>
+          </a:ln>
+        </p:spPr>
+        <p:style>
+          <a:lnRef idx="2">
+            <a:schemeClr val="accent1">
+              <a:shade val="50000"/>
+            </a:schemeClr>
+          </a:lnRef>
+          <a:fillRef idx="1">
+            <a:schemeClr val="accent1"/>
+          </a:fillRef>
+          <a:effectRef idx="0">
+            <a:schemeClr val="accent1"/>
+          </a:effectRef>
+          <a:fontRef idx="minor">
+            <a:schemeClr val="lt1"/>
+          </a:fontRef>
+        </p:style>
+        <p:txBody>
+          <a:bodyPr wrap="none" lIns="52922" tIns="52922" rIns="52922" rtlCol="0" anchor="ctr"/>
+          <a:lstStyle/>
+          <a:p>
+            <a:pPr algn="ctr" defTabSz="672130"/>
+            <a:endParaRPr lang="en-US" sz="1176" dirty="0">
+              <a:solidFill>
+                <a:srgbClr val="00B050"/>
+              </a:solidFill>
+              <a:latin typeface="Exo 2 Medium" panose="00000600000000000000" pitchFamily="50" charset="0"/>
+              <a:cs typeface="Simplon BP Regular"/>
+            </a:endParaRPr>
+          </a:p>
+        </p:txBody>
+      </p:sp>
+    </p:spTree>
+    <p:extLst>
+      <p:ext uri="{BB962C8B-B14F-4D97-AF65-F5344CB8AC3E}">
+        <p14:creationId xmlns:p14="http://schemas.microsoft.com/office/powerpoint/2010/main" val="1064413745"/>
       </p:ext>
     </p:extLst>
   </p:cSld>
@@ -28725,18 +30882,18 @@
 </file>
 
 <file path=customXml/item1.xml><?xml version="1.0" encoding="utf-8"?>
-<p:properties xmlns:p="http://schemas.microsoft.com/office/2006/metadata/properties" xmlns:xsi="http://www.w3.org/2001/XMLSchema-instance" xmlns:pc="http://schemas.microsoft.com/office/infopath/2007/PartnerControls">
-  <documentManagement/>
-</p:properties>
-</file>
-
-<file path=customXml/item2.xml><?xml version="1.0" encoding="utf-8"?>
 <?mso-contentType ?>
 <FormTemplates xmlns="http://schemas.microsoft.com/sharepoint/v3/contenttype/forms">
   <Display>DocumentLibraryForm</Display>
   <Edit>DocumentLibraryForm</Edit>
   <New>DocumentLibraryForm</New>
 </FormTemplates>
+</file>
+
+<file path=customXml/item2.xml><?xml version="1.0" encoding="utf-8"?>
+<p:properties xmlns:p="http://schemas.microsoft.com/office/2006/metadata/properties" xmlns:xsi="http://www.w3.org/2001/XMLSchema-instance" xmlns:pc="http://schemas.microsoft.com/office/infopath/2007/PartnerControls">
+  <documentManagement/>
+</p:properties>
 </file>
 
 <file path=customXml/item3.xml><?xml version="1.0" encoding="utf-8"?>
@@ -28854,6 +31011,14 @@
 </file>
 
 <file path=customXml/itemProps1.xml><?xml version="1.0" encoding="utf-8"?>
+<ds:datastoreItem xmlns:ds="http://schemas.openxmlformats.org/officeDocument/2006/customXml" ds:itemID="{E2481852-F24E-4532-AF30-C154D705D105}">
+  <ds:schemaRefs>
+    <ds:schemaRef ds:uri="http://schemas.microsoft.com/sharepoint/v3/contenttype/forms"/>
+  </ds:schemaRefs>
+</ds:datastoreItem>
+</file>
+
+<file path=customXml/itemProps2.xml><?xml version="1.0" encoding="utf-8"?>
 <ds:datastoreItem xmlns:ds="http://schemas.openxmlformats.org/officeDocument/2006/customXml" ds:itemID="{4B31267F-D399-4A8A-87F8-B75F56828412}">
   <ds:schemaRefs>
     <ds:schemaRef ds:uri="http://www.w3.org/XML/1998/namespace"/>
@@ -28866,14 +31031,6 @@
     <ds:schemaRef ds:uri="http://schemas.openxmlformats.org/package/2006/metadata/core-properties"/>
     <ds:schemaRef ds:uri="http://schemas.microsoft.com/office/2006/metadata/properties"/>
     <ds:schemaRef ds:uri="http://purl.org/dc/terms/"/>
-  </ds:schemaRefs>
-</ds:datastoreItem>
-</file>
-
-<file path=customXml/itemProps2.xml><?xml version="1.0" encoding="utf-8"?>
-<ds:datastoreItem xmlns:ds="http://schemas.openxmlformats.org/officeDocument/2006/customXml" ds:itemID="{E2481852-F24E-4532-AF30-C154D705D105}">
-  <ds:schemaRefs>
-    <ds:schemaRef ds:uri="http://schemas.microsoft.com/sharepoint/v3/contenttype/forms"/>
   </ds:schemaRefs>
 </ds:datastoreItem>
 </file>

</xml_diff>